<commit_message>
Added a "RESTful Nirvana" Slide to the slide deck
</commit_message>
<xml_diff>
--- a/Veni-Cloud Engineering Project.pptx
+++ b/Veni-Cloud Engineering Project.pptx
@@ -10,6 +10,7 @@
     <p:sldId id="270" r:id="rId4"/>
     <p:sldId id="265" r:id="rId5"/>
     <p:sldId id="271" r:id="rId6"/>
+    <p:sldId id="272" r:id="rId7"/>
   </p:sldIdLst>
   <p:sldSz cx="12192000" cy="6858000"/>
   <p:notesSz cx="6858000" cy="9144000"/>
@@ -9233,10 +9234,6 @@
               <a:rPr lang="en-US" dirty="0" smtClean="0"/>
               <a:t>Intel +</a:t>
             </a:r>
-            <a:r>
-              <a:rPr lang="en-US" dirty="0" smtClean="0"/>
-              <a:t/>
-            </a:r>
             <a:br>
               <a:rPr lang="en-US" dirty="0" smtClean="0"/>
             </a:br>
@@ -10043,55 +10040,29 @@
           <a:p>
             <a:r>
               <a:rPr lang="en-US" dirty="0" smtClean="0"/>
-              <a:t>A </a:t>
-            </a:r>
+              <a:t>A VistA system (or systems)</a:t>
+            </a:r>
+          </a:p>
+          <a:p>
+            <a:pPr lvl="1"/>
             <a:r>
               <a:rPr lang="en-US" dirty="0" smtClean="0"/>
-              <a:t>VistA system (or systems)</a:t>
-            </a:r>
-          </a:p>
-          <a:p>
-            <a:pPr lvl="1"/>
+              <a:t>We’ve set up a dev-sandboxed instance running </a:t>
+            </a:r>
+            <a:r>
+              <a:rPr lang="en-US" smtClean="0"/>
+              <a:t>on Linux </a:t>
+            </a:r>
             <a:r>
               <a:rPr lang="en-US" dirty="0" smtClean="0"/>
-              <a:t>We’ve </a:t>
-            </a:r>
-            <a:r>
-              <a:rPr lang="en-US" dirty="0" smtClean="0"/>
-              <a:t>set up a dev-sandboxed </a:t>
-            </a:r>
-            <a:r>
-              <a:rPr lang="en-US" dirty="0" smtClean="0"/>
-              <a:t>instance running </a:t>
-            </a:r>
-            <a:r>
-              <a:rPr lang="en-US" smtClean="0"/>
-              <a:t>on Linux </a:t>
-            </a:r>
-            <a:r>
-              <a:rPr lang="en-US" dirty="0" smtClean="0"/>
-              <a:t>in </a:t>
-            </a:r>
-            <a:r>
-              <a:rPr lang="en-US" dirty="0" smtClean="0"/>
-              <a:t>an AWS </a:t>
-            </a:r>
-            <a:r>
-              <a:rPr lang="en-US" dirty="0" smtClean="0"/>
-              <a:t>cloud </a:t>
-            </a:r>
-            <a:r>
-              <a:rPr lang="en-US" dirty="0" smtClean="0"/>
-              <a:t>VM</a:t>
-            </a:r>
-            <a:endParaRPr lang="en-US" dirty="0" smtClean="0"/>
+              <a:t>in an AWS cloud VM</a:t>
+            </a:r>
           </a:p>
           <a:p>
             <a:r>
               <a:rPr lang="en-US" dirty="0" smtClean="0"/>
               <a:t>A middle tier web-service application </a:t>
             </a:r>
-            <a:endParaRPr lang="en-US" dirty="0" smtClean="0"/>
           </a:p>
           <a:p>
             <a:pPr lvl="1"/>
@@ -10119,11 +10090,7 @@
           <a:p>
             <a:r>
               <a:rPr lang="en-US" dirty="0" smtClean="0"/>
-              <a:t>A </a:t>
-            </a:r>
-            <a:r>
-              <a:rPr lang="en-US" dirty="0" smtClean="0"/>
-              <a:t>phone application that includes logic and UI but no data</a:t>
+              <a:t>A phone application that includes logic and UI but no data</a:t>
             </a:r>
           </a:p>
           <a:p>
@@ -10137,13 +10104,8 @@
             <a:pPr lvl="1"/>
             <a:r>
               <a:rPr lang="en-US" dirty="0" smtClean="0"/>
-              <a:t>The phone app will use the phone’s location services and </a:t>
-            </a:r>
-            <a:r>
-              <a:rPr lang="en-US" dirty="0" smtClean="0"/>
-              <a:t>calendar</a:t>
-            </a:r>
-            <a:endParaRPr lang="en-US" dirty="0" smtClean="0"/>
+              <a:t>The phone app will use the phone’s location services and calendar</a:t>
+            </a:r>
           </a:p>
         </p:txBody>
       </p:sp>
@@ -12232,6 +12194,135 @@
 </p:sld>
 </file>
 
+<file path=ppt/slides/slide6.xml><?xml version="1.0" encoding="utf-8"?>
+<p:sld xmlns:a="http://schemas.openxmlformats.org/drawingml/2006/main" xmlns:r="http://schemas.openxmlformats.org/officeDocument/2006/relationships" xmlns:p="http://schemas.openxmlformats.org/presentationml/2006/main">
+  <p:cSld>
+    <p:spTree>
+      <p:nvGrpSpPr>
+        <p:cNvPr id="1" name=""/>
+        <p:cNvGrpSpPr/>
+        <p:nvPr/>
+      </p:nvGrpSpPr>
+      <p:grpSpPr>
+        <a:xfrm>
+          <a:off x="0" y="0"/>
+          <a:ext cx="0" cy="0"/>
+          <a:chOff x="0" y="0"/>
+          <a:chExt cx="0" cy="0"/>
+        </a:xfrm>
+      </p:grpSpPr>
+      <p:sp>
+        <p:nvSpPr>
+          <p:cNvPr id="2" name="Title 1"/>
+          <p:cNvSpPr>
+            <a:spLocks noGrp="1"/>
+          </p:cNvSpPr>
+          <p:nvPr>
+            <p:ph type="title"/>
+          </p:nvPr>
+        </p:nvSpPr>
+        <p:spPr/>
+        <p:txBody>
+          <a:bodyPr/>
+          <a:lstStyle/>
+          <a:p>
+            <a:r>
+              <a:rPr lang="en-US" smtClean="0"/>
+              <a:t>RESTful Nirvana?</a:t>
+            </a:r>
+            <a:endParaRPr lang="en-US"/>
+          </a:p>
+        </p:txBody>
+      </p:sp>
+      <p:sp>
+        <p:nvSpPr>
+          <p:cNvPr id="3" name="Content Placeholder 2"/>
+          <p:cNvSpPr>
+            <a:spLocks noGrp="1"/>
+          </p:cNvSpPr>
+          <p:nvPr>
+            <p:ph idx="1"/>
+          </p:nvPr>
+        </p:nvSpPr>
+        <p:spPr>
+          <a:xfrm>
+            <a:off x="680321" y="2336873"/>
+            <a:ext cx="10086002" cy="3599316"/>
+          </a:xfrm>
+        </p:spPr>
+        <p:txBody>
+          <a:bodyPr/>
+          <a:lstStyle/>
+          <a:p>
+            <a:r>
+              <a:rPr lang="en-US" dirty="0" smtClean="0"/>
+              <a:t>All services use plain-old JSON to represent the state being transferred</a:t>
+            </a:r>
+          </a:p>
+          <a:p>
+            <a:r>
+              <a:rPr lang="en-US" dirty="0" smtClean="0"/>
+              <a:t>Everything is fully stateless</a:t>
+            </a:r>
+          </a:p>
+          <a:p>
+            <a:pPr lvl="1"/>
+            <a:r>
+              <a:rPr lang="en-US" dirty="0" smtClean="0"/>
+              <a:t>Only server-side state is authentication session – described by an opaque token</a:t>
+            </a:r>
+          </a:p>
+          <a:p>
+            <a:r>
+              <a:rPr lang="en-US" dirty="0" smtClean="0"/>
+              <a:t>State described as resources and collections of resources</a:t>
+            </a:r>
+          </a:p>
+          <a:p>
+            <a:pPr lvl="1"/>
+            <a:r>
+              <a:rPr lang="en-US" dirty="0" smtClean="0"/>
+              <a:t>Out of band information in HTTP headers</a:t>
+            </a:r>
+          </a:p>
+          <a:p>
+            <a:pPr lvl="1"/>
+            <a:r>
+              <a:rPr lang="en-US" dirty="0" smtClean="0"/>
+              <a:t>Queries to narrow state selection passed in query-strings</a:t>
+            </a:r>
+          </a:p>
+          <a:p>
+            <a:r>
+              <a:rPr lang="en-US" dirty="0" smtClean="0"/>
+              <a:t>Access by standard HTTP verbs: GET, POST, PUT, DELETE</a:t>
+            </a:r>
+          </a:p>
+          <a:p>
+            <a:r>
+              <a:rPr lang="en-US" dirty="0" smtClean="0"/>
+              <a:t>Use of hypermedia links where appropriate</a:t>
+            </a:r>
+            <a:endParaRPr lang="en-US" dirty="0"/>
+          </a:p>
+        </p:txBody>
+      </p:sp>
+    </p:spTree>
+    <p:extLst>
+      <p:ext uri="{BB962C8B-B14F-4D97-AF65-F5344CB8AC3E}">
+        <p14:creationId xmlns:p14="http://schemas.microsoft.com/office/powerpoint/2010/main" val="1199071533"/>
+      </p:ext>
+    </p:extLst>
+  </p:cSld>
+  <p:clrMapOvr>
+    <a:masterClrMapping/>
+  </p:clrMapOvr>
+  <p:transition spd="slow">
+    <p:wipe dir="r"/>
+  </p:transition>
+</p:sld>
+</file>
+
 <file path=ppt/theme/theme1.xml><?xml version="1.0" encoding="utf-8"?>
 <a:theme xmlns:a="http://schemas.openxmlformats.org/drawingml/2006/main" name="Berlin">
   <a:themeElements>

</xml_diff>